<commit_message>
deures del 13 al 15
</commit_message>
<xml_diff>
--- a/13-15-05-2020/EXPERIMENTS_Marc_Rios.pptx
+++ b/13-15-05-2020/EXPERIMENTS_Marc_Rios.pptx
@@ -5,7 +5,7 @@
     <p:sldMasterId id="2147483648" r:id="rId1"/>
   </p:sldMasterIdLst>
   <p:notesMasterIdLst>
-    <p:notesMasterId r:id="rId10"/>
+    <p:notesMasterId r:id="rId11"/>
   </p:notesMasterIdLst>
   <p:sldIdLst>
     <p:sldId id="256" r:id="rId2"/>
@@ -14,20 +14,21 @@
     <p:sldId id="259" r:id="rId5"/>
     <p:sldId id="260" r:id="rId6"/>
     <p:sldId id="261" r:id="rId7"/>
-    <p:sldId id="262" r:id="rId8"/>
-    <p:sldId id="263" r:id="rId9"/>
+    <p:sldId id="264" r:id="rId8"/>
+    <p:sldId id="262" r:id="rId9"/>
+    <p:sldId id="263" r:id="rId10"/>
   </p:sldIdLst>
   <p:sldSz cx="12192000" cy="6858000"/>
   <p:notesSz cx="6858000" cy="9144000"/>
   <p:embeddedFontLst>
     <p:embeddedFont>
-      <p:font typeface="Gill Sans" panose="020B0604020202020204" charset="0"/>
-      <p:regular r:id="rId11"/>
-      <p:bold r:id="rId12"/>
+      <p:font typeface="Impact" panose="020B0806030902050204" pitchFamily="34" charset="0"/>
+      <p:regular r:id="rId12"/>
     </p:embeddedFont>
     <p:embeddedFont>
-      <p:font typeface="Impact" panose="020B0806030902050204" pitchFamily="34" charset="0"/>
+      <p:font typeface="Gill Sans" panose="020B0604020202020204" charset="0"/>
       <p:regular r:id="rId13"/>
+      <p:bold r:id="rId14"/>
     </p:embeddedFont>
   </p:embeddedFontLst>
   <p:defaultTextStyle>
@@ -260,6 +261,9 @@
     </a:lvl9pPr>
   </p:defaultTextStyle>
   <p:extLst>
+    <p:ext uri="{EFAFB233-063F-42B5-8137-9DF3F51BA10A}">
+      <p15:sldGuideLst xmlns:p15="http://schemas.microsoft.com/office/powerpoint/2012/main"/>
+    </p:ext>
     <p:ext uri="http://customooxmlschemas.google.com/">
       <go:slidesCustomData xmlns:go="http://customooxmlschemas.google.com/" xmlns:p15="http://schemas.microsoft.com/office/powerpoint/2012/main" xmlns:p14="http://schemas.microsoft.com/office/powerpoint/2010/main" xmlns:com="http://schemas.openxmlformats.org/drawingml/2006/compatibility" xmlns:pvml="urn:schemas-microsoft-com:office:powerpoint" xmlns:v="urn:schemas-microsoft-com:vml" xmlns:o="urn:schemas-microsoft-com:office:office" xmlns:dgm="http://schemas.openxmlformats.org/drawingml/2006/diagram" xmlns:c="http://schemas.openxmlformats.org/drawingml/2006/chart" xmlns:mv="urn:schemas-microsoft-com:mac:vml" xmlns:mc="http://schemas.openxmlformats.org/markup-compatibility/2006" xmlns="" r:id="rId15" roundtripDataSignature="AMtx7mgvbT2buEx5iWy6Fjj57lzKVqGT1w=="/>
     </p:ext>
@@ -1350,7 +1354,7 @@
               </a:spcAft>
               <a:buNone/>
             </a:pPr>
-            <a:endParaRPr/>
+            <a:endParaRPr dirty="0"/>
           </a:p>
         </p:txBody>
       </p:sp>
@@ -1368,6 +1372,115 @@
 </file>
 
 <file path=ppt/notesSlides/notesSlide7.xml><?xml version="1.0" encoding="utf-8"?>
+<p:notes xmlns:a="http://schemas.openxmlformats.org/drawingml/2006/main" xmlns:r="http://schemas.openxmlformats.org/officeDocument/2006/relationships" xmlns:p="http://schemas.openxmlformats.org/presentationml/2006/main" showMasterSp="0" showMasterPhAnim="0">
+  <p:cSld>
+    <p:spTree>
+      <p:nvGrpSpPr>
+        <p:cNvPr id="1" name="Shape 125"/>
+        <p:cNvGrpSpPr/>
+        <p:nvPr/>
+      </p:nvGrpSpPr>
+      <p:grpSpPr>
+        <a:xfrm>
+          <a:off x="0" y="0"/>
+          <a:ext cx="0" cy="0"/>
+          <a:chOff x="0" y="0"/>
+          <a:chExt cx="0" cy="0"/>
+        </a:xfrm>
+      </p:grpSpPr>
+      <p:sp>
+        <p:nvSpPr>
+          <p:cNvPr id="126" name="Google Shape;126;g7767cbbf3f_3_5:notes"/>
+          <p:cNvSpPr>
+            <a:spLocks noGrp="1" noRot="1" noChangeAspect="1"/>
+          </p:cNvSpPr>
+          <p:nvPr>
+            <p:ph type="sldImg" idx="2"/>
+          </p:nvPr>
+        </p:nvSpPr>
+        <p:spPr>
+          <a:xfrm>
+            <a:off x="381000" y="685800"/>
+            <a:ext cx="6096000" cy="3429000"/>
+          </a:xfrm>
+          <a:custGeom>
+            <a:avLst/>
+            <a:gdLst/>
+            <a:ahLst/>
+            <a:cxnLst/>
+            <a:rect l="l" t="t" r="r" b="b"/>
+            <a:pathLst>
+              <a:path w="120000" h="120000" extrusionOk="0">
+                <a:moveTo>
+                  <a:pt x="0" y="0"/>
+                </a:moveTo>
+                <a:lnTo>
+                  <a:pt x="120000" y="0"/>
+                </a:lnTo>
+                <a:lnTo>
+                  <a:pt x="120000" y="120000"/>
+                </a:lnTo>
+                <a:lnTo>
+                  <a:pt x="0" y="120000"/>
+                </a:lnTo>
+                <a:close/>
+              </a:path>
+            </a:pathLst>
+          </a:custGeom>
+        </p:spPr>
+      </p:sp>
+      <p:sp>
+        <p:nvSpPr>
+          <p:cNvPr id="127" name="Google Shape;127;g7767cbbf3f_3_5:notes"/>
+          <p:cNvSpPr txBox="1">
+            <a:spLocks noGrp="1"/>
+          </p:cNvSpPr>
+          <p:nvPr>
+            <p:ph type="body" idx="1"/>
+          </p:nvPr>
+        </p:nvSpPr>
+        <p:spPr>
+          <a:xfrm>
+            <a:off x="685800" y="4343400"/>
+            <a:ext cx="5486400" cy="4114800"/>
+          </a:xfrm>
+          <a:prstGeom prst="rect">
+            <a:avLst/>
+          </a:prstGeom>
+        </p:spPr>
+        <p:txBody>
+          <a:bodyPr spcFirstLastPara="1" wrap="square" lIns="91425" tIns="91425" rIns="91425" bIns="91425" anchor="t" anchorCtr="0">
+            <a:noAutofit/>
+          </a:bodyPr>
+          <a:lstStyle/>
+          <a:p>
+            <a:pPr marL="0" lvl="0" indent="0" algn="l" rtl="0">
+              <a:spcBef>
+                <a:spcPts val="0"/>
+              </a:spcBef>
+              <a:spcAft>
+                <a:spcPts val="0"/>
+              </a:spcAft>
+              <a:buNone/>
+            </a:pPr>
+            <a:endParaRPr dirty="0"/>
+          </a:p>
+        </p:txBody>
+      </p:sp>
+    </p:spTree>
+    <p:extLst>
+      <p:ext uri="{BB962C8B-B14F-4D97-AF65-F5344CB8AC3E}">
+        <p14:creationId xmlns:p14="http://schemas.microsoft.com/office/powerpoint/2010/main" val="2945783187"/>
+      </p:ext>
+    </p:extLst>
+  </p:cSld>
+  <p:clrMapOvr>
+    <a:masterClrMapping/>
+  </p:clrMapOvr>
+</p:notes>
+</file>
+
+<file path=ppt/notesSlides/notesSlide8.xml><?xml version="1.0" encoding="utf-8"?>
 <p:notes xmlns:a="http://schemas.openxmlformats.org/drawingml/2006/main" xmlns:r="http://schemas.openxmlformats.org/officeDocument/2006/relationships" xmlns:p="http://schemas.openxmlformats.org/presentationml/2006/main" showMasterSp="0" showMasterPhAnim="0">
   <p:cSld>
     <p:spTree>
@@ -1459,7 +1572,7 @@
               </a:spcAft>
               <a:buNone/>
             </a:pPr>
-            <a:endParaRPr/>
+            <a:endParaRPr dirty="0"/>
           </a:p>
         </p:txBody>
       </p:sp>
@@ -1476,7 +1589,7 @@
 </p:notes>
 </file>
 
-<file path=ppt/notesSlides/notesSlide8.xml><?xml version="1.0" encoding="utf-8"?>
+<file path=ppt/notesSlides/notesSlide9.xml><?xml version="1.0" encoding="utf-8"?>
 <p:notes xmlns:a="http://schemas.openxmlformats.org/drawingml/2006/main" xmlns:r="http://schemas.openxmlformats.org/officeDocument/2006/relationships" xmlns:p="http://schemas.openxmlformats.org/presentationml/2006/main" showMasterSp="0" showMasterPhAnim="0">
   <p:cSld>
     <p:spTree>
@@ -1568,7 +1681,7 @@
               </a:spcAft>
               <a:buNone/>
             </a:pPr>
-            <a:endParaRPr/>
+            <a:endParaRPr dirty="0"/>
           </a:p>
         </p:txBody>
       </p:sp>
@@ -3089,7 +3202,7 @@
             </a:lvl9pPr>
           </a:lstStyle>
           <a:p>
-            <a:endParaRPr/>
+            <a:endParaRPr dirty="0"/>
           </a:p>
         </p:txBody>
       </p:sp>
@@ -3226,7 +3339,7 @@
             </a:lvl9pPr>
           </a:lstStyle>
           <a:p>
-            <a:endParaRPr/>
+            <a:endParaRPr dirty="0"/>
           </a:p>
         </p:txBody>
       </p:sp>
@@ -3408,7 +3521,7 @@
               <a:rPr lang="es-ES"/>
               <a:t>‹Nº›</a:t>
             </a:fld>
-            <a:endParaRPr/>
+            <a:endParaRPr dirty="0"/>
           </a:p>
         </p:txBody>
       </p:sp>
@@ -3448,7 +3561,7 @@
               </a:spcAft>
               <a:buNone/>
             </a:pPr>
-            <a:endParaRPr/>
+            <a:endParaRPr dirty="0"/>
           </a:p>
         </p:txBody>
       </p:sp>
@@ -3905,7 +4018,7 @@
             </a:lvl9pPr>
           </a:lstStyle>
           <a:p>
-            <a:endParaRPr/>
+            <a:endParaRPr dirty="0"/>
           </a:p>
         </p:txBody>
       </p:sp>
@@ -4038,7 +4151,7 @@
             </a:lvl9pPr>
           </a:lstStyle>
           <a:p>
-            <a:endParaRPr/>
+            <a:endParaRPr dirty="0"/>
           </a:p>
         </p:txBody>
       </p:sp>
@@ -4148,7 +4261,7 @@
               <a:rPr lang="es-ES"/>
               <a:t>‹Nº›</a:t>
             </a:fld>
-            <a:endParaRPr/>
+            <a:endParaRPr dirty="0"/>
           </a:p>
         </p:txBody>
       </p:sp>
@@ -4605,7 +4718,7 @@
             </a:lvl9pPr>
           </a:lstStyle>
           <a:p>
-            <a:endParaRPr/>
+            <a:endParaRPr dirty="0"/>
           </a:p>
         </p:txBody>
       </p:sp>
@@ -4738,7 +4851,7 @@
             </a:lvl9pPr>
           </a:lstStyle>
           <a:p>
-            <a:endParaRPr/>
+            <a:endParaRPr dirty="0"/>
           </a:p>
         </p:txBody>
       </p:sp>
@@ -4848,7 +4961,7 @@
               <a:rPr lang="es-ES"/>
               <a:t>‹Nº›</a:t>
             </a:fld>
-            <a:endParaRPr/>
+            <a:endParaRPr dirty="0"/>
           </a:p>
         </p:txBody>
       </p:sp>
@@ -5305,7 +5418,7 @@
             </a:lvl9pPr>
           </a:lstStyle>
           <a:p>
-            <a:endParaRPr/>
+            <a:endParaRPr dirty="0"/>
           </a:p>
         </p:txBody>
       </p:sp>
@@ -5438,7 +5551,7 @@
             </a:lvl9pPr>
           </a:lstStyle>
           <a:p>
-            <a:endParaRPr/>
+            <a:endParaRPr dirty="0"/>
           </a:p>
         </p:txBody>
       </p:sp>
@@ -5548,7 +5661,7 @@
               <a:rPr lang="es-ES"/>
               <a:t>‹Nº›</a:t>
             </a:fld>
-            <a:endParaRPr/>
+            <a:endParaRPr dirty="0"/>
           </a:p>
         </p:txBody>
       </p:sp>
@@ -6058,7 +6171,7 @@
             </a:lvl9pPr>
           </a:lstStyle>
           <a:p>
-            <a:endParaRPr/>
+            <a:endParaRPr dirty="0"/>
           </a:p>
         </p:txBody>
       </p:sp>
@@ -6195,7 +6308,7 @@
             </a:lvl9pPr>
           </a:lstStyle>
           <a:p>
-            <a:endParaRPr/>
+            <a:endParaRPr dirty="0"/>
           </a:p>
         </p:txBody>
       </p:sp>
@@ -6377,7 +6490,7 @@
               <a:rPr lang="es-ES"/>
               <a:t>‹Nº›</a:t>
             </a:fld>
-            <a:endParaRPr/>
+            <a:endParaRPr dirty="0"/>
           </a:p>
         </p:txBody>
       </p:sp>
@@ -7929,7 +8042,7 @@
             </a:lvl9pPr>
           </a:lstStyle>
           <a:p>
-            <a:endParaRPr/>
+            <a:endParaRPr dirty="0"/>
           </a:p>
         </p:txBody>
       </p:sp>
@@ -8062,7 +8175,7 @@
             </a:lvl9pPr>
           </a:lstStyle>
           <a:p>
-            <a:endParaRPr/>
+            <a:endParaRPr dirty="0"/>
           </a:p>
         </p:txBody>
       </p:sp>
@@ -8172,7 +8285,7 @@
               <a:rPr lang="es-ES"/>
               <a:t>‹Nº›</a:t>
             </a:fld>
-            <a:endParaRPr/>
+            <a:endParaRPr dirty="0"/>
           </a:p>
         </p:txBody>
       </p:sp>
@@ -9117,7 +9230,7 @@
             </a:lvl9pPr>
           </a:lstStyle>
           <a:p>
-            <a:endParaRPr/>
+            <a:endParaRPr dirty="0"/>
           </a:p>
         </p:txBody>
       </p:sp>
@@ -9250,7 +9363,7 @@
             </a:lvl9pPr>
           </a:lstStyle>
           <a:p>
-            <a:endParaRPr/>
+            <a:endParaRPr dirty="0"/>
           </a:p>
         </p:txBody>
       </p:sp>
@@ -9360,7 +9473,7 @@
               <a:rPr lang="es-ES"/>
               <a:t>‹Nº›</a:t>
             </a:fld>
-            <a:endParaRPr/>
+            <a:endParaRPr dirty="0"/>
           </a:p>
         </p:txBody>
       </p:sp>
@@ -9657,7 +9770,7 @@
             </a:lvl9pPr>
           </a:lstStyle>
           <a:p>
-            <a:endParaRPr/>
+            <a:endParaRPr dirty="0"/>
           </a:p>
         </p:txBody>
       </p:sp>
@@ -9790,7 +9903,7 @@
             </a:lvl9pPr>
           </a:lstStyle>
           <a:p>
-            <a:endParaRPr/>
+            <a:endParaRPr dirty="0"/>
           </a:p>
         </p:txBody>
       </p:sp>
@@ -9900,7 +10013,7 @@
               <a:rPr lang="es-ES"/>
               <a:t>‹Nº›</a:t>
             </a:fld>
-            <a:endParaRPr/>
+            <a:endParaRPr dirty="0"/>
           </a:p>
         </p:txBody>
       </p:sp>
@@ -10058,7 +10171,7 @@
             </a:lvl9pPr>
           </a:lstStyle>
           <a:p>
-            <a:endParaRPr/>
+            <a:endParaRPr dirty="0"/>
           </a:p>
         </p:txBody>
       </p:sp>
@@ -10191,7 +10304,7 @@
             </a:lvl9pPr>
           </a:lstStyle>
           <a:p>
-            <a:endParaRPr/>
+            <a:endParaRPr dirty="0"/>
           </a:p>
         </p:txBody>
       </p:sp>
@@ -10301,7 +10414,7 @@
               <a:rPr lang="es-ES"/>
               <a:t>‹Nº›</a:t>
             </a:fld>
-            <a:endParaRPr/>
+            <a:endParaRPr dirty="0"/>
           </a:p>
         </p:txBody>
       </p:sp>
@@ -11388,7 +11501,7 @@
             </a:lvl9pPr>
           </a:lstStyle>
           <a:p>
-            <a:endParaRPr/>
+            <a:endParaRPr dirty="0"/>
           </a:p>
         </p:txBody>
       </p:sp>
@@ -11521,7 +11634,7 @@
             </a:lvl9pPr>
           </a:lstStyle>
           <a:p>
-            <a:endParaRPr/>
+            <a:endParaRPr dirty="0"/>
           </a:p>
         </p:txBody>
       </p:sp>
@@ -11631,7 +11744,7 @@
               <a:rPr lang="es-ES"/>
               <a:t>‹Nº›</a:t>
             </a:fld>
-            <a:endParaRPr/>
+            <a:endParaRPr dirty="0"/>
           </a:p>
         </p:txBody>
       </p:sp>
@@ -11671,7 +11784,7 @@
               </a:spcAft>
               <a:buNone/>
             </a:pPr>
-            <a:endParaRPr/>
+            <a:endParaRPr dirty="0"/>
           </a:p>
         </p:txBody>
       </p:sp>
@@ -11975,7 +12088,7 @@
             </a:lvl9pPr>
           </a:lstStyle>
           <a:p>
-            <a:endParaRPr/>
+            <a:endParaRPr dirty="0"/>
           </a:p>
         </p:txBody>
       </p:sp>
@@ -12472,7 +12585,7 @@
               </a:spcAft>
               <a:buNone/>
             </a:pPr>
-            <a:endParaRPr/>
+            <a:endParaRPr dirty="0"/>
           </a:p>
         </p:txBody>
       </p:sp>
@@ -12917,7 +13030,7 @@
             </a:lvl9pPr>
           </a:lstStyle>
           <a:p>
-            <a:endParaRPr/>
+            <a:endParaRPr dirty="0"/>
           </a:p>
         </p:txBody>
       </p:sp>
@@ -13050,7 +13163,7 @@
             </a:lvl9pPr>
           </a:lstStyle>
           <a:p>
-            <a:endParaRPr/>
+            <a:endParaRPr dirty="0"/>
           </a:p>
         </p:txBody>
       </p:sp>
@@ -13160,7 +13273,7 @@
               <a:rPr lang="es-ES"/>
               <a:t>‹Nº›</a:t>
             </a:fld>
-            <a:endParaRPr/>
+            <a:endParaRPr dirty="0"/>
           </a:p>
         </p:txBody>
       </p:sp>
@@ -13814,7 +13927,7 @@
             </a:lvl9pPr>
           </a:lstStyle>
           <a:p>
-            <a:endParaRPr/>
+            <a:endParaRPr dirty="0"/>
           </a:p>
         </p:txBody>
       </p:sp>
@@ -14019,7 +14132,7 @@
             </a:lvl9pPr>
           </a:lstStyle>
           <a:p>
-            <a:endParaRPr/>
+            <a:endParaRPr dirty="0"/>
           </a:p>
         </p:txBody>
       </p:sp>
@@ -14201,7 +14314,7 @@
               <a:rPr lang="es-ES"/>
               <a:t>‹Nº›</a:t>
             </a:fld>
-            <a:endParaRPr/>
+            <a:endParaRPr dirty="0"/>
           </a:p>
         </p:txBody>
       </p:sp>
@@ -14701,7 +14814,7 @@
               </a:spcAft>
               <a:buNone/>
             </a:pPr>
-            <a:endParaRPr/>
+            <a:endParaRPr dirty="0"/>
           </a:p>
         </p:txBody>
       </p:sp>
@@ -15694,24 +15807,15 @@
               <a:buNone/>
             </a:pPr>
             <a:r>
-              <a:rPr lang="es-ES" sz="2400" dirty="0" err="1">
+              <a:rPr lang="es-ES" sz="2400" dirty="0">
                 <a:latin typeface="Arial"/>
                 <a:ea typeface="Arial"/>
                 <a:cs typeface="Arial"/>
                 <a:sym typeface="Arial"/>
               </a:rPr>
-              <a:t>Escriu</a:t>
+              <a:t>Escriu a continuació què és per a tu la ciència. Explica-ho amb les teves paraules. </a:t>
             </a:r>
-            <a:r>
-              <a:rPr lang="es-ES" sz="2400">
-                <a:latin typeface="Arial"/>
-                <a:ea typeface="Arial"/>
-                <a:cs typeface="Arial"/>
-                <a:sym typeface="Arial"/>
-              </a:rPr>
-              <a:t> a continuació què és per a tu la ciència. Explica-ho amb les teves paraules. </a:t>
-            </a:r>
-            <a:endParaRPr sz="2400">
+            <a:endParaRPr sz="2400" dirty="0">
               <a:latin typeface="Arial"/>
               <a:ea typeface="Arial"/>
               <a:cs typeface="Arial"/>
@@ -15758,16 +15862,39 @@
             <a:endParaRPr lang="es-ES" dirty="0" smtClean="0"/>
           </a:p>
           <a:p>
+            <a:pPr marL="114300" indent="0">
+              <a:spcBef>
+                <a:spcPts val="0"/>
+              </a:spcBef>
+              <a:buNone/>
+            </a:pPr>
             <a:r>
               <a:rPr lang="ca-ES" dirty="0"/>
-              <a:t>La ciència es la facultat dels éssers humans que ens permet explorar, conèixer, analitzar i observar, donant curs a la nostra curiositat i trobant respostes a tot el que ens puguem arribar a preguntar.</a:t>
+              <a:t>La ciència </a:t>
             </a:r>
-            <a:endParaRPr lang="es-ES" dirty="0"/>
-          </a:p>
-          <a:p>
+            <a:r>
+              <a:rPr lang="ca-ES" dirty="0" smtClean="0"/>
+              <a:t>es lo </a:t>
+            </a:r>
             <a:r>
               <a:rPr lang="ca-ES" dirty="0"/>
-              <a:t>Tenim el mètode científic que consisteix en Plantejar un problema, di una idea de com resoldrà lo, si cal fe un experiment o una proba, fe una conclusió de aquet problema y si cal tornar a fer un nou plantejament. </a:t>
+              <a:t>que nos permet explorar </a:t>
+            </a:r>
+            <a:r>
+              <a:rPr lang="ca-ES" dirty="0" smtClean="0"/>
+              <a:t>i conèixer </a:t>
+            </a:r>
+            <a:r>
+              <a:rPr lang="ca-ES" dirty="0"/>
+              <a:t>noves coses ham la ciència no i a límits ham la ciència i a que provar mes cures per les infermetats, per la nova tecnologia del futur que vindrà </a:t>
+            </a:r>
+            <a:r>
+              <a:rPr lang="ca-ES" dirty="0" smtClean="0"/>
+              <a:t>de </a:t>
+            </a:r>
+            <a:r>
+              <a:rPr lang="ca-ES" dirty="0"/>
+              <a:t>sort que tenim  el mètode científic que es plantejar un problema, fer una hipòtesis, experimentar-lo, fer una conclusió i si fa falta fer una nova hipòtesis. </a:t>
             </a:r>
             <a:endParaRPr lang="es-ES" dirty="0"/>
           </a:p>
@@ -15983,214 +16110,7 @@
                 <a:cs typeface="Arial"/>
                 <a:sym typeface="Arial"/>
               </a:rPr>
-              <a:t>Escriu</a:t>
-            </a:r>
-            <a:r>
-              <a:rPr lang="es-ES" sz="2400" dirty="0">
-                <a:latin typeface="Arial"/>
-                <a:ea typeface="Arial"/>
-                <a:cs typeface="Arial"/>
-                <a:sym typeface="Arial"/>
-              </a:rPr>
-              <a:t> a </a:t>
-            </a:r>
-            <a:r>
-              <a:rPr lang="es-ES" sz="2400" dirty="0">
-                <a:latin typeface="Arial"/>
-                <a:ea typeface="Arial"/>
-                <a:cs typeface="Arial"/>
-                <a:sym typeface="Arial"/>
-              </a:rPr>
-              <a:t>continuació</a:t>
-            </a:r>
-            <a:r>
-              <a:rPr lang="es-ES" sz="2400" dirty="0">
-                <a:latin typeface="Arial"/>
-                <a:ea typeface="Arial"/>
-                <a:cs typeface="Arial"/>
-                <a:sym typeface="Arial"/>
-              </a:rPr>
-              <a:t> que </a:t>
-            </a:r>
-            <a:r>
-              <a:rPr lang="es-ES" sz="2400" dirty="0">
-                <a:latin typeface="Arial"/>
-                <a:ea typeface="Arial"/>
-                <a:cs typeface="Arial"/>
-                <a:sym typeface="Arial"/>
-              </a:rPr>
-              <a:t>t’imagines</a:t>
-            </a:r>
-            <a:r>
-              <a:rPr lang="es-ES" sz="2400" dirty="0">
-                <a:latin typeface="Arial"/>
-                <a:ea typeface="Arial"/>
-                <a:cs typeface="Arial"/>
-                <a:sym typeface="Arial"/>
-              </a:rPr>
-              <a:t> </a:t>
-            </a:r>
-            <a:r>
-              <a:rPr lang="es-ES" sz="2400" dirty="0">
-                <a:latin typeface="Arial"/>
-                <a:ea typeface="Arial"/>
-                <a:cs typeface="Arial"/>
-                <a:sym typeface="Arial"/>
-              </a:rPr>
-              <a:t>què</a:t>
-            </a:r>
-            <a:r>
-              <a:rPr lang="es-ES" sz="2400" dirty="0">
-                <a:latin typeface="Arial"/>
-                <a:ea typeface="Arial"/>
-                <a:cs typeface="Arial"/>
-                <a:sym typeface="Arial"/>
-              </a:rPr>
-              <a:t> fa un </a:t>
-            </a:r>
-            <a:r>
-              <a:rPr lang="es-ES" sz="2400" dirty="0">
-                <a:latin typeface="Arial"/>
-                <a:ea typeface="Arial"/>
-                <a:cs typeface="Arial"/>
-                <a:sym typeface="Arial"/>
-              </a:rPr>
-              <a:t>científic</a:t>
-            </a:r>
-            <a:r>
-              <a:rPr lang="es-ES" sz="2400" dirty="0">
-                <a:latin typeface="Arial"/>
-                <a:ea typeface="Arial"/>
-                <a:cs typeface="Arial"/>
-                <a:sym typeface="Arial"/>
-              </a:rPr>
-              <a:t> en el </a:t>
-            </a:r>
-            <a:r>
-              <a:rPr lang="es-ES" sz="2400" dirty="0">
-                <a:latin typeface="Arial"/>
-                <a:ea typeface="Arial"/>
-                <a:cs typeface="Arial"/>
-                <a:sym typeface="Arial"/>
-              </a:rPr>
-              <a:t>seu</a:t>
-            </a:r>
-            <a:r>
-              <a:rPr lang="es-ES" sz="2400" dirty="0">
-                <a:latin typeface="Arial"/>
-                <a:ea typeface="Arial"/>
-                <a:cs typeface="Arial"/>
-                <a:sym typeface="Arial"/>
-              </a:rPr>
-              <a:t> </a:t>
-            </a:r>
-            <a:r>
-              <a:rPr lang="es-ES" sz="2400" dirty="0">
-                <a:latin typeface="Arial"/>
-                <a:ea typeface="Arial"/>
-                <a:cs typeface="Arial"/>
-                <a:sym typeface="Arial"/>
-              </a:rPr>
-              <a:t>dia</a:t>
-            </a:r>
-            <a:r>
-              <a:rPr lang="es-ES" sz="2400" dirty="0">
-                <a:latin typeface="Arial"/>
-                <a:ea typeface="Arial"/>
-                <a:cs typeface="Arial"/>
-                <a:sym typeface="Arial"/>
-              </a:rPr>
-              <a:t> a </a:t>
-            </a:r>
-            <a:r>
-              <a:rPr lang="es-ES" sz="2400" dirty="0">
-                <a:latin typeface="Arial"/>
-                <a:ea typeface="Arial"/>
-                <a:cs typeface="Arial"/>
-                <a:sym typeface="Arial"/>
-              </a:rPr>
-              <a:t>dia</a:t>
-            </a:r>
-            <a:r>
-              <a:rPr lang="es-ES" sz="2400" dirty="0">
-                <a:latin typeface="Arial"/>
-                <a:ea typeface="Arial"/>
-                <a:cs typeface="Arial"/>
-                <a:sym typeface="Arial"/>
-              </a:rPr>
-              <a:t>, </a:t>
-            </a:r>
-            <a:r>
-              <a:rPr lang="es-ES" sz="2400" dirty="0">
-                <a:latin typeface="Arial"/>
-                <a:ea typeface="Arial"/>
-                <a:cs typeface="Arial"/>
-                <a:sym typeface="Arial"/>
-              </a:rPr>
-              <a:t>què</a:t>
-            </a:r>
-            <a:r>
-              <a:rPr lang="es-ES" sz="2400" dirty="0">
-                <a:latin typeface="Arial"/>
-                <a:ea typeface="Arial"/>
-                <a:cs typeface="Arial"/>
-                <a:sym typeface="Arial"/>
-              </a:rPr>
-              <a:t> fa </a:t>
-            </a:r>
-            <a:r>
-              <a:rPr lang="es-ES" sz="2400" dirty="0">
-                <a:latin typeface="Arial"/>
-                <a:ea typeface="Arial"/>
-                <a:cs typeface="Arial"/>
-                <a:sym typeface="Arial"/>
-              </a:rPr>
-              <a:t>quan</a:t>
-            </a:r>
-            <a:r>
-              <a:rPr lang="es-ES" sz="2400" dirty="0">
-                <a:latin typeface="Arial"/>
-                <a:ea typeface="Arial"/>
-                <a:cs typeface="Arial"/>
-                <a:sym typeface="Arial"/>
-              </a:rPr>
-              <a:t> </a:t>
-            </a:r>
-            <a:r>
-              <a:rPr lang="es-ES" sz="2400" dirty="0">
-                <a:latin typeface="Arial"/>
-                <a:ea typeface="Arial"/>
-                <a:cs typeface="Arial"/>
-                <a:sym typeface="Arial"/>
-              </a:rPr>
-              <a:t>està</a:t>
-            </a:r>
-            <a:r>
-              <a:rPr lang="es-ES" sz="2400" dirty="0">
-                <a:latin typeface="Arial"/>
-                <a:ea typeface="Arial"/>
-                <a:cs typeface="Arial"/>
-                <a:sym typeface="Arial"/>
-              </a:rPr>
-              <a:t> al </a:t>
-            </a:r>
-            <a:r>
-              <a:rPr lang="es-ES" sz="2400" dirty="0">
-                <a:latin typeface="Arial"/>
-                <a:ea typeface="Arial"/>
-                <a:cs typeface="Arial"/>
-                <a:sym typeface="Arial"/>
-              </a:rPr>
-              <a:t>laboratori</a:t>
-            </a:r>
-            <a:r>
-              <a:rPr lang="es-ES" sz="2400" dirty="0">
-                <a:latin typeface="Arial"/>
-                <a:ea typeface="Arial"/>
-                <a:cs typeface="Arial"/>
-                <a:sym typeface="Arial"/>
-              </a:rPr>
-              <a:t>...</a:t>
+              <a:t>Escriu a continuació que t’imagines què fa un científic en el seu dia a dia, què fa quan està al laboratori...</a:t>
             </a:r>
             <a:endParaRPr sz="2400" dirty="0">
               <a:latin typeface="Arial"/>
@@ -16249,11 +16169,7 @@
             </a:r>
             <a:r>
               <a:rPr lang="ca-ES" dirty="0"/>
-              <a:t>desenvolupament  d'una cura per una malaltia, nous sistemes informàtics y mecànics, de les noves tecnologies. </a:t>
-            </a:r>
-            <a:r>
-              <a:rPr lang="ca-ES"/>
-              <a:t>No només al que mira per un microscopi es científic</a:t>
+              <a:t>desenvolupament  d'una cura per una malaltia, nous sistemes informàtics y mecànics, de les noves tecnologies. No només al que mira per un microscopi es científic</a:t>
             </a:r>
             <a:endParaRPr dirty="0"/>
           </a:p>
@@ -16694,19 +16610,7 @@
                 <a:cs typeface="Arial"/>
                 <a:sym typeface="Arial"/>
               </a:rPr>
-              <a:t>Visualitza</a:t>
-            </a:r>
-            <a:r>
-              <a:rPr lang="es-ES" sz="2400" dirty="0">
-                <a:solidFill>
-                  <a:srgbClr val="000000"/>
-                </a:solidFill>
-                <a:latin typeface="Arial"/>
-                <a:ea typeface="Arial"/>
-                <a:cs typeface="Arial"/>
-                <a:sym typeface="Arial"/>
-              </a:rPr>
-              <a:t> el vídeo sobre </a:t>
+              <a:t>Visualitza el vídeo sobre </a:t>
             </a:r>
             <a:r>
               <a:rPr lang="es-ES" sz="2400" i="1" dirty="0">
@@ -17196,21 +17100,13 @@
           </a:bodyPr>
           <a:lstStyle/>
           <a:p>
-            <a:pPr marL="457200" lvl="0" indent="-342900" algn="l" rtl="0">
+            <a:pPr>
               <a:lnSpc>
                 <a:spcPct val="300000"/>
               </a:lnSpc>
-              <a:spcBef>
-                <a:spcPts val="700"/>
-              </a:spcBef>
-              <a:spcAft>
-                <a:spcPts val="0"/>
-              </a:spcAft>
-              <a:buSzPts val="1800"/>
-              <a:buChar char="•"/>
             </a:pPr>
             <a:r>
-              <a:rPr lang="es-ES">
+              <a:rPr lang="es-ES" dirty="0">
                 <a:latin typeface="Arial"/>
                 <a:ea typeface="Arial"/>
                 <a:cs typeface="Arial"/>
@@ -17218,7 +17114,60 @@
               </a:rPr>
               <a:t>¿Qué es el método científico? </a:t>
             </a:r>
-            <a:endParaRPr>
+            <a:r>
+              <a:rPr lang="ca-ES" dirty="0">
+                <a:ea typeface="Arial"/>
+                <a:cs typeface="Arial"/>
+              </a:rPr>
+              <a:t>E</a:t>
+            </a:r>
+            <a:r>
+              <a:rPr lang="ca-ES" dirty="0" smtClean="0"/>
+              <a:t>l </a:t>
+            </a:r>
+            <a:r>
+              <a:rPr lang="ca-ES" dirty="0"/>
+              <a:t>mètode científic que es plantejar un problema, fer una hipòtesis, experimentar-lo, fer una conclusió i si fa falta fer una nova hipòtesis. </a:t>
+            </a:r>
+            <a:endParaRPr dirty="0">
+              <a:latin typeface="Arial"/>
+              <a:ea typeface="Arial"/>
+              <a:cs typeface="Arial"/>
+              <a:sym typeface="Arial"/>
+            </a:endParaRPr>
+          </a:p>
+          <a:p>
+            <a:pPr lvl="0">
+              <a:lnSpc>
+                <a:spcPct val="300000"/>
+              </a:lnSpc>
+              <a:spcBef>
+                <a:spcPts val="0"/>
+              </a:spcBef>
+            </a:pPr>
+            <a:r>
+              <a:rPr lang="es-ES" dirty="0">
+                <a:latin typeface="Arial"/>
+                <a:ea typeface="Arial"/>
+                <a:cs typeface="Arial"/>
+                <a:sym typeface="Arial"/>
+              </a:rPr>
+              <a:t>¿Cuál es el primer paso del método científico</a:t>
+            </a:r>
+            <a:r>
+              <a:rPr lang="es-ES" dirty="0" smtClean="0">
+                <a:latin typeface="Arial"/>
+                <a:ea typeface="Arial"/>
+                <a:cs typeface="Arial"/>
+                <a:sym typeface="Arial"/>
+              </a:rPr>
+              <a:t>?</a:t>
+            </a:r>
+            <a:r>
+              <a:rPr lang="ca-ES" dirty="0"/>
+              <a:t> es plantejar un problema</a:t>
+            </a:r>
+            <a:endParaRPr dirty="0">
               <a:latin typeface="Arial"/>
               <a:ea typeface="Arial"/>
               <a:cs typeface="Arial"/>
@@ -17240,75 +17189,33 @@
               <a:buChar char="•"/>
             </a:pPr>
             <a:r>
-              <a:rPr lang="es-ES">
+              <a:rPr lang="es-ES" dirty="0" smtClean="0">
                 <a:latin typeface="Arial"/>
                 <a:ea typeface="Arial"/>
                 <a:cs typeface="Arial"/>
                 <a:sym typeface="Arial"/>
               </a:rPr>
-              <a:t>¿Cuál es el primer paso del método científico?</a:t>
+              <a:t>¿</a:t>
             </a:r>
-            <a:endParaRPr>
-              <a:latin typeface="Arial"/>
-              <a:ea typeface="Arial"/>
-              <a:cs typeface="Arial"/>
-              <a:sym typeface="Arial"/>
-            </a:endParaRPr>
-          </a:p>
-          <a:p>
-            <a:pPr marL="457200" lvl="0" indent="-342900" algn="l" rtl="0">
-              <a:lnSpc>
-                <a:spcPct val="300000"/>
-              </a:lnSpc>
-              <a:spcBef>
-                <a:spcPts val="0"/>
-              </a:spcBef>
-              <a:spcAft>
-                <a:spcPts val="0"/>
-              </a:spcAft>
-              <a:buSzPts val="1800"/>
-              <a:buChar char="•"/>
-            </a:pPr>
             <a:r>
-              <a:rPr lang="es-ES">
+              <a:rPr lang="es-ES" dirty="0">
                 <a:latin typeface="Arial"/>
                 <a:ea typeface="Arial"/>
                 <a:cs typeface="Arial"/>
                 <a:sym typeface="Arial"/>
               </a:rPr>
-              <a:t>¿Qué es una hipótesis?</a:t>
+              <a:t>Cuál es el tercer paso</a:t>
             </a:r>
-            <a:endParaRPr>
-              <a:latin typeface="Arial"/>
-              <a:ea typeface="Arial"/>
-              <a:cs typeface="Arial"/>
-              <a:sym typeface="Arial"/>
-            </a:endParaRPr>
-          </a:p>
-          <a:p>
-            <a:pPr marL="457200" lvl="0" indent="-342900" algn="l" rtl="0">
-              <a:lnSpc>
-                <a:spcPct val="300000"/>
-              </a:lnSpc>
-              <a:spcBef>
-                <a:spcPts val="0"/>
-              </a:spcBef>
-              <a:spcAft>
-                <a:spcPts val="0"/>
-              </a:spcAft>
-              <a:buSzPts val="1800"/>
-              <a:buChar char="•"/>
-            </a:pPr>
             <a:r>
-              <a:rPr lang="es-ES">
+              <a:rPr lang="es-ES" dirty="0" smtClean="0">
                 <a:latin typeface="Arial"/>
                 <a:ea typeface="Arial"/>
                 <a:cs typeface="Arial"/>
                 <a:sym typeface="Arial"/>
               </a:rPr>
-              <a:t>¿Cuál es el tercer paso?</a:t>
+              <a:t>? Experimentarlo.</a:t>
             </a:r>
-            <a:endParaRPr>
+            <a:endParaRPr dirty="0">
               <a:latin typeface="Arial"/>
               <a:ea typeface="Arial"/>
               <a:cs typeface="Arial"/>
@@ -17328,7 +17235,7 @@
               </a:spcAft>
               <a:buNone/>
             </a:pPr>
-            <a:endParaRPr>
+            <a:endParaRPr dirty="0">
               <a:latin typeface="Arial"/>
               <a:ea typeface="Arial"/>
               <a:cs typeface="Arial"/>
@@ -17346,6 +17253,273 @@
 </file>
 
 <file path=ppt/slides/slide7.xml><?xml version="1.0" encoding="utf-8"?>
+<p:sld xmlns:a="http://schemas.openxmlformats.org/drawingml/2006/main" xmlns:r="http://schemas.openxmlformats.org/officeDocument/2006/relationships" xmlns:p="http://schemas.openxmlformats.org/presentationml/2006/main">
+  <p:cSld>
+    <p:spTree>
+      <p:nvGrpSpPr>
+        <p:cNvPr id="1" name="Shape 128"/>
+        <p:cNvGrpSpPr/>
+        <p:nvPr/>
+      </p:nvGrpSpPr>
+      <p:grpSpPr>
+        <a:xfrm>
+          <a:off x="0" y="0"/>
+          <a:ext cx="0" cy="0"/>
+          <a:chOff x="0" y="0"/>
+          <a:chExt cx="0" cy="0"/>
+        </a:xfrm>
+      </p:grpSpPr>
+      <p:sp>
+        <p:nvSpPr>
+          <p:cNvPr id="130" name="Google Shape;130;g7767cbbf3f_3_5"/>
+          <p:cNvSpPr txBox="1">
+            <a:spLocks noGrp="1"/>
+          </p:cNvSpPr>
+          <p:nvPr>
+            <p:ph type="body" idx="1"/>
+          </p:nvPr>
+        </p:nvSpPr>
+        <p:spPr>
+          <a:xfrm>
+            <a:off x="1251675" y="2286000"/>
+            <a:ext cx="10178400" cy="3805800"/>
+          </a:xfrm>
+          <a:prstGeom prst="rect">
+            <a:avLst/>
+          </a:prstGeom>
+        </p:spPr>
+        <p:txBody>
+          <a:bodyPr spcFirstLastPara="1" wrap="square" lIns="91425" tIns="45700" rIns="91425" bIns="45700" anchor="t" anchorCtr="0">
+            <a:noAutofit/>
+          </a:bodyPr>
+          <a:lstStyle/>
+          <a:p>
+            <a:pPr marL="457200" lvl="0" indent="-342900" algn="l" rtl="0">
+              <a:lnSpc>
+                <a:spcPct val="300000"/>
+              </a:lnSpc>
+              <a:spcBef>
+                <a:spcPts val="0"/>
+              </a:spcBef>
+              <a:spcAft>
+                <a:spcPts val="0"/>
+              </a:spcAft>
+              <a:buSzPts val="1800"/>
+              <a:buChar char="•"/>
+            </a:pPr>
+            <a:r>
+              <a:rPr lang="es-ES" dirty="0" smtClean="0">
+                <a:latin typeface="Arial"/>
+                <a:ea typeface="Arial"/>
+                <a:cs typeface="Arial"/>
+                <a:sym typeface="Arial"/>
+              </a:rPr>
+              <a:t>¿</a:t>
+            </a:r>
+            <a:r>
+              <a:rPr lang="es-ES" dirty="0">
+                <a:latin typeface="Arial"/>
+                <a:ea typeface="Arial"/>
+                <a:cs typeface="Arial"/>
+                <a:sym typeface="Arial"/>
+              </a:rPr>
+              <a:t>Qué es una hipótesis</a:t>
+            </a:r>
+            <a:r>
+              <a:rPr lang="es-ES" dirty="0" smtClean="0">
+                <a:latin typeface="Arial"/>
+                <a:ea typeface="Arial"/>
+                <a:cs typeface="Arial"/>
+                <a:sym typeface="Arial"/>
+              </a:rPr>
+              <a:t>? Es una pregunta que  es resol am un problema o </a:t>
+            </a:r>
+            <a:r>
+              <a:rPr lang="es-ES" dirty="0" err="1" smtClean="0">
+                <a:latin typeface="Arial"/>
+                <a:ea typeface="Arial"/>
+                <a:cs typeface="Arial"/>
+                <a:sym typeface="Arial"/>
+              </a:rPr>
+              <a:t>fent</a:t>
+            </a:r>
+            <a:r>
+              <a:rPr lang="es-ES" dirty="0" smtClean="0">
+                <a:latin typeface="Arial"/>
+                <a:ea typeface="Arial"/>
+                <a:cs typeface="Arial"/>
+                <a:sym typeface="Arial"/>
+              </a:rPr>
+              <a:t> un experiment</a:t>
+            </a:r>
+            <a:endParaRPr dirty="0">
+              <a:latin typeface="Arial"/>
+              <a:ea typeface="Arial"/>
+              <a:cs typeface="Arial"/>
+              <a:sym typeface="Arial"/>
+            </a:endParaRPr>
+          </a:p>
+          <a:p>
+            <a:pPr marL="457200" lvl="0" indent="-342900" algn="l" rtl="0">
+              <a:lnSpc>
+                <a:spcPct val="300000"/>
+              </a:lnSpc>
+              <a:spcBef>
+                <a:spcPts val="0"/>
+              </a:spcBef>
+              <a:spcAft>
+                <a:spcPts val="0"/>
+              </a:spcAft>
+              <a:buSzPts val="1800"/>
+              <a:buChar char="•"/>
+            </a:pPr>
+            <a:r>
+              <a:rPr lang="es-ES" dirty="0">
+                <a:latin typeface="Arial"/>
+                <a:ea typeface="Arial"/>
+                <a:cs typeface="Arial"/>
+                <a:sym typeface="Arial"/>
+              </a:rPr>
+              <a:t>¿Cuál es el tercer paso</a:t>
+            </a:r>
+            <a:r>
+              <a:rPr lang="es-ES" dirty="0" smtClean="0">
+                <a:latin typeface="Arial"/>
+                <a:ea typeface="Arial"/>
+                <a:cs typeface="Arial"/>
+                <a:sym typeface="Arial"/>
+              </a:rPr>
+              <a:t>? </a:t>
+            </a:r>
+            <a:r>
+              <a:rPr lang="es-ES" dirty="0" err="1" smtClean="0">
+                <a:latin typeface="Arial"/>
+                <a:ea typeface="Arial"/>
+                <a:cs typeface="Arial"/>
+                <a:sym typeface="Arial"/>
+              </a:rPr>
+              <a:t>Demostra</a:t>
+            </a:r>
+            <a:r>
+              <a:rPr lang="es-ES" dirty="0" smtClean="0">
+                <a:latin typeface="Arial"/>
+                <a:ea typeface="Arial"/>
+                <a:cs typeface="Arial"/>
+                <a:sym typeface="Arial"/>
+              </a:rPr>
+              <a:t> </a:t>
+            </a:r>
+            <a:r>
+              <a:rPr lang="es-ES" dirty="0" err="1" smtClean="0">
+                <a:latin typeface="Arial"/>
+                <a:ea typeface="Arial"/>
+                <a:cs typeface="Arial"/>
+                <a:sym typeface="Arial"/>
+              </a:rPr>
+              <a:t>amb</a:t>
+            </a:r>
+            <a:r>
+              <a:rPr lang="es-ES" dirty="0" smtClean="0">
+                <a:latin typeface="Arial"/>
+                <a:ea typeface="Arial"/>
+                <a:cs typeface="Arial"/>
+                <a:sym typeface="Arial"/>
+              </a:rPr>
+              <a:t> un </a:t>
+            </a:r>
+            <a:r>
+              <a:rPr lang="es-ES" dirty="0" err="1" smtClean="0">
+                <a:latin typeface="Arial"/>
+                <a:ea typeface="Arial"/>
+                <a:cs typeface="Arial"/>
+                <a:sym typeface="Arial"/>
+              </a:rPr>
+              <a:t>experiment</a:t>
+            </a:r>
+            <a:r>
+              <a:rPr lang="es-ES" dirty="0" smtClean="0">
+                <a:latin typeface="Arial"/>
+                <a:ea typeface="Arial"/>
+                <a:cs typeface="Arial"/>
+                <a:sym typeface="Arial"/>
+              </a:rPr>
+              <a:t> la </a:t>
+            </a:r>
+            <a:r>
+              <a:rPr lang="es-ES" dirty="0" err="1" smtClean="0">
+                <a:latin typeface="Arial"/>
+                <a:ea typeface="Arial"/>
+                <a:cs typeface="Arial"/>
+                <a:sym typeface="Arial"/>
+              </a:rPr>
+              <a:t>hipotesis</a:t>
+            </a:r>
+            <a:endParaRPr dirty="0">
+              <a:latin typeface="Arial"/>
+              <a:ea typeface="Arial"/>
+              <a:cs typeface="Arial"/>
+              <a:sym typeface="Arial"/>
+            </a:endParaRPr>
+          </a:p>
+          <a:p>
+            <a:pPr marL="457200" lvl="0" indent="0" algn="l" rtl="0">
+              <a:lnSpc>
+                <a:spcPct val="200000"/>
+              </a:lnSpc>
+              <a:spcBef>
+                <a:spcPts val="700"/>
+              </a:spcBef>
+              <a:spcAft>
+                <a:spcPts val="0"/>
+              </a:spcAft>
+              <a:buNone/>
+            </a:pPr>
+            <a:endParaRPr dirty="0">
+              <a:latin typeface="Arial"/>
+              <a:ea typeface="Arial"/>
+              <a:cs typeface="Arial"/>
+              <a:sym typeface="Arial"/>
+            </a:endParaRPr>
+          </a:p>
+        </p:txBody>
+      </p:sp>
+      <p:sp>
+        <p:nvSpPr>
+          <p:cNvPr id="2" name="Título 1"/>
+          <p:cNvSpPr>
+            <a:spLocks noGrp="1"/>
+          </p:cNvSpPr>
+          <p:nvPr>
+            <p:ph type="title"/>
+          </p:nvPr>
+        </p:nvSpPr>
+        <p:spPr/>
+        <p:txBody>
+          <a:bodyPr/>
+          <a:lstStyle/>
+          <a:p>
+            <a:r>
+              <a:rPr lang="es-ES" dirty="0" smtClean="0"/>
+              <a:t>PAGINA 2</a:t>
+            </a:r>
+            <a:endParaRPr lang="es-ES" dirty="0"/>
+          </a:p>
+        </p:txBody>
+      </p:sp>
+    </p:spTree>
+    <p:extLst>
+      <p:ext uri="{BB962C8B-B14F-4D97-AF65-F5344CB8AC3E}">
+        <p14:creationId xmlns:p14="http://schemas.microsoft.com/office/powerpoint/2010/main" val="2503823929"/>
+      </p:ext>
+    </p:extLst>
+  </p:cSld>
+  <p:clrMapOvr>
+    <a:masterClrMapping/>
+  </p:clrMapOvr>
+</p:sld>
+</file>
+
+<file path=ppt/slides/slide8.xml><?xml version="1.0" encoding="utf-8"?>
 <p:sld xmlns:a="http://schemas.openxmlformats.org/drawingml/2006/main" xmlns:r="http://schemas.openxmlformats.org/officeDocument/2006/relationships" xmlns:p="http://schemas.openxmlformats.org/presentationml/2006/main">
   <p:cSld>
     <p:spTree>
@@ -17397,13 +17571,13 @@
               <a:buNone/>
             </a:pPr>
             <a:r>
-              <a:rPr lang="es-ES"/>
+              <a:rPr lang="es-ES" dirty="0"/>
               <a:t>PREGUNTAS</a:t>
             </a:r>
             <a:br>
-              <a:rPr lang="es-ES"/>
+              <a:rPr lang="es-ES" dirty="0"/>
             </a:br>
-            <a:endParaRPr sz="2400" i="1">
+            <a:endParaRPr sz="2400" i="1" dirty="0">
               <a:latin typeface="Arial"/>
               <a:ea typeface="Arial"/>
               <a:cs typeface="Arial"/>
@@ -17451,15 +17625,24 @@
               <a:buChar char="•"/>
             </a:pPr>
             <a:r>
-              <a:rPr lang="es-ES">
+              <a:rPr lang="es-ES" dirty="0">
                 <a:latin typeface="Arial"/>
                 <a:ea typeface="Arial"/>
                 <a:cs typeface="Arial"/>
                 <a:sym typeface="Arial"/>
               </a:rPr>
-              <a:t>¿Qué nombre recibe el tercer paso?</a:t>
+              <a:t>¿Qué nombre recibe el tercer paso</a:t>
             </a:r>
-            <a:endParaRPr>
+            <a:r>
+              <a:rPr lang="es-ES" dirty="0" smtClean="0">
+                <a:latin typeface="Arial"/>
+                <a:ea typeface="Arial"/>
+                <a:cs typeface="Arial"/>
+                <a:sym typeface="Arial"/>
+              </a:rPr>
+              <a:t>? Experimentacio</a:t>
+            </a:r>
+            <a:endParaRPr dirty="0">
               <a:latin typeface="Arial"/>
               <a:ea typeface="Arial"/>
               <a:cs typeface="Arial"/>
@@ -17482,15 +17665,69 @@
               <a:buChar char="•"/>
             </a:pPr>
             <a:r>
-              <a:rPr lang="es-ES">
+              <a:rPr lang="es-ES" dirty="0">
                 <a:latin typeface="Arial"/>
                 <a:ea typeface="Arial"/>
                 <a:cs typeface="Arial"/>
                 <a:sym typeface="Arial"/>
               </a:rPr>
-              <a:t>¿Es bueno equivocarse en el método científico?</a:t>
+              <a:t>¿Es bueno equivocarse en el método científico</a:t>
             </a:r>
-            <a:endParaRPr>
+            <a:r>
+              <a:rPr lang="es-ES" dirty="0" smtClean="0">
+                <a:latin typeface="Arial"/>
+                <a:ea typeface="Arial"/>
+                <a:cs typeface="Arial"/>
+                <a:sym typeface="Arial"/>
+              </a:rPr>
+              <a:t>? Si perqué </a:t>
+            </a:r>
+            <a:r>
+              <a:rPr lang="es-ES" dirty="0" err="1" smtClean="0">
+                <a:latin typeface="Arial"/>
+                <a:ea typeface="Arial"/>
+                <a:cs typeface="Arial"/>
+                <a:sym typeface="Arial"/>
+              </a:rPr>
+              <a:t>aprens</a:t>
+            </a:r>
+            <a:r>
+              <a:rPr lang="es-ES" dirty="0" smtClean="0">
+                <a:latin typeface="Arial"/>
+                <a:ea typeface="Arial"/>
+                <a:cs typeface="Arial"/>
+                <a:sym typeface="Arial"/>
+              </a:rPr>
+              <a:t> </a:t>
+            </a:r>
+            <a:r>
+              <a:rPr lang="es-ES" dirty="0" err="1" smtClean="0">
+                <a:latin typeface="Arial"/>
+                <a:ea typeface="Arial"/>
+                <a:cs typeface="Arial"/>
+                <a:sym typeface="Arial"/>
+              </a:rPr>
+              <a:t>dels</a:t>
+            </a:r>
+            <a:r>
+              <a:rPr lang="es-ES" dirty="0" smtClean="0">
+                <a:latin typeface="Arial"/>
+                <a:ea typeface="Arial"/>
+                <a:cs typeface="Arial"/>
+                <a:sym typeface="Arial"/>
+              </a:rPr>
+              <a:t> </a:t>
+            </a:r>
+            <a:r>
+              <a:rPr lang="es-ES" dirty="0" err="1" smtClean="0">
+                <a:latin typeface="Arial"/>
+                <a:ea typeface="Arial"/>
+                <a:cs typeface="Arial"/>
+                <a:sym typeface="Arial"/>
+              </a:rPr>
+              <a:t>errors</a:t>
+            </a:r>
+            <a:endParaRPr dirty="0">
               <a:latin typeface="Arial"/>
               <a:ea typeface="Arial"/>
               <a:cs typeface="Arial"/>
@@ -17498,30 +17735,69 @@
             </a:endParaRPr>
           </a:p>
           <a:p>
-            <a:pPr marL="457200" lvl="0" indent="-342900" algn="l" rtl="0">
+            <a:pPr lvl="0">
               <a:lnSpc>
                 <a:spcPct val="300000"/>
               </a:lnSpc>
               <a:spcBef>
                 <a:spcPts val="0"/>
               </a:spcBef>
-              <a:spcAft>
-                <a:spcPts val="0"/>
-              </a:spcAft>
-              <a:buSzPts val="1800"/>
-              <a:buFont typeface="Arial"/>
-              <a:buChar char="•"/>
             </a:pPr>
             <a:r>
-              <a:rPr lang="es-ES">
+              <a:rPr lang="es-ES" dirty="0">
                 <a:latin typeface="Arial"/>
                 <a:ea typeface="Arial"/>
                 <a:cs typeface="Arial"/>
                 <a:sym typeface="Arial"/>
               </a:rPr>
-              <a:t>¿Qué pasa si el resultado no coincide con nuestra hipótesis?</a:t>
+              <a:t>¿Qué pasa si el resultado no coincide con nuestra hipótesis</a:t>
             </a:r>
-            <a:endParaRPr>
+            <a:r>
+              <a:rPr lang="es-ES" dirty="0" smtClean="0">
+                <a:latin typeface="Arial"/>
+                <a:ea typeface="Arial"/>
+                <a:cs typeface="Arial"/>
+                <a:sym typeface="Arial"/>
+              </a:rPr>
+              <a:t>? Que </a:t>
+            </a:r>
+            <a:r>
+              <a:rPr lang="es-ES" dirty="0" err="1" smtClean="0">
+                <a:latin typeface="Arial"/>
+                <a:ea typeface="Arial"/>
+                <a:cs typeface="Arial"/>
+                <a:sym typeface="Arial"/>
+              </a:rPr>
+              <a:t>tens</a:t>
+            </a:r>
+            <a:r>
+              <a:rPr lang="es-ES" dirty="0" smtClean="0">
+                <a:latin typeface="Arial"/>
+                <a:ea typeface="Arial"/>
+                <a:cs typeface="Arial"/>
+                <a:sym typeface="Arial"/>
+              </a:rPr>
+              <a:t> que </a:t>
+            </a:r>
+            <a:r>
+              <a:rPr lang="es-ES" dirty="0" err="1" smtClean="0">
+                <a:latin typeface="Arial"/>
+                <a:ea typeface="Arial"/>
+                <a:cs typeface="Arial"/>
+                <a:sym typeface="Arial"/>
+              </a:rPr>
+              <a:t>fer</a:t>
+            </a:r>
+            <a:r>
+              <a:rPr lang="es-ES" dirty="0" smtClean="0">
+                <a:latin typeface="Arial"/>
+                <a:ea typeface="Arial"/>
+                <a:cs typeface="Arial"/>
+                <a:sym typeface="Arial"/>
+              </a:rPr>
+              <a:t> una nova hipótesis</a:t>
+            </a:r>
+            <a:endParaRPr dirty="0">
               <a:latin typeface="Arial"/>
               <a:ea typeface="Arial"/>
               <a:cs typeface="Arial"/>
@@ -17566,7 +17842,7 @@
 </p:sld>
 </file>
 
-<file path=ppt/slides/slide8.xml><?xml version="1.0" encoding="utf-8"?>
+<file path=ppt/slides/slide9.xml><?xml version="1.0" encoding="utf-8"?>
 <p:sld xmlns:a="http://schemas.openxmlformats.org/drawingml/2006/main" xmlns:r="http://schemas.openxmlformats.org/officeDocument/2006/relationships" xmlns:p="http://schemas.openxmlformats.org/presentationml/2006/main">
   <p:cSld>
     <p:spTree>
@@ -17618,22 +17894,26 @@
               <a:buNone/>
             </a:pPr>
             <a:r>
-              <a:rPr lang="es-ES"/>
+              <a:rPr lang="es-ES" dirty="0"/>
               <a:t>DIARI CIENTÍFIC </a:t>
             </a:r>
             <a:r>
-              <a:rPr lang="es-ES" sz="3600"/>
-              <a:t>(del 13 al 15 de maig)</a:t>
+              <a:rPr lang="es-ES" sz="3600" dirty="0"/>
+              <a:t>(del 13 al 15 de </a:t>
             </a:r>
             <a:r>
-              <a:rPr lang="es-ES"/>
+              <a:rPr lang="es-ES" sz="3600" dirty="0" smtClean="0"/>
+              <a:t>mail)</a:t>
+            </a:r>
+            <a:r>
+              <a:rPr lang="es-ES" dirty="0"/>
               <a:t/>
             </a:r>
             <a:br>
-              <a:rPr lang="es-ES"/>
+              <a:rPr lang="es-ES" dirty="0"/>
             </a:br>
             <a:r>
-              <a:rPr lang="es-ES" sz="2400">
+              <a:rPr lang="es-ES" sz="2400" dirty="0">
                 <a:latin typeface="Arial"/>
                 <a:ea typeface="Arial"/>
                 <a:cs typeface="Arial"/>
@@ -17641,7 +17921,7 @@
               </a:rPr>
               <a:t>Explica en català què has descobert durant aquesta setmana.</a:t>
             </a:r>
-            <a:endParaRPr sz="2400">
+            <a:endParaRPr sz="2400" dirty="0">
               <a:latin typeface="Arial"/>
               <a:ea typeface="Arial"/>
               <a:cs typeface="Arial"/>
@@ -17684,7 +17964,104 @@
               </a:spcAft>
               <a:buNone/>
             </a:pPr>
-            <a:endParaRPr/>
+            <a:r>
+              <a:rPr lang="es-ES" dirty="0" smtClean="0"/>
+              <a:t>Jo he apres que es la ciencia que fa un cientifc tambe he apres el </a:t>
+            </a:r>
+            <a:r>
+              <a:rPr lang="es-ES" dirty="0" err="1" smtClean="0"/>
+              <a:t>metode</a:t>
+            </a:r>
+            <a:r>
+              <a:rPr lang="es-ES" dirty="0" smtClean="0"/>
+              <a:t> </a:t>
+            </a:r>
+            <a:r>
+              <a:rPr lang="es-ES" dirty="0" err="1" smtClean="0"/>
+              <a:t>cientific</a:t>
+            </a:r>
+            <a:r>
+              <a:rPr lang="es-ES" dirty="0" smtClean="0"/>
+              <a:t>.</a:t>
+            </a:r>
+          </a:p>
+          <a:p>
+            <a:pPr marL="0" lvl="0" indent="0" algn="l" rtl="0">
+              <a:spcBef>
+                <a:spcPts val="700"/>
+              </a:spcBef>
+              <a:spcAft>
+                <a:spcPts val="0"/>
+              </a:spcAft>
+              <a:buNone/>
+            </a:pPr>
+            <a:endParaRPr lang="es-ES" dirty="0"/>
+          </a:p>
+          <a:p>
+            <a:pPr marL="0" lvl="0" indent="0" algn="l" rtl="0">
+              <a:spcBef>
+                <a:spcPts val="700"/>
+              </a:spcBef>
+              <a:spcAft>
+                <a:spcPts val="0"/>
+              </a:spcAft>
+              <a:buNone/>
+            </a:pPr>
+            <a:r>
+              <a:rPr lang="es-ES" dirty="0" smtClean="0"/>
+              <a:t>Mi </a:t>
+            </a:r>
+            <a:r>
+              <a:rPr lang="es-ES" dirty="0" err="1" smtClean="0"/>
+              <a:t>demostració</a:t>
+            </a:r>
+            <a:r>
+              <a:rPr lang="es-ES" dirty="0" smtClean="0"/>
+              <a:t> de método </a:t>
+            </a:r>
+            <a:r>
+              <a:rPr lang="es-ES" dirty="0" err="1" smtClean="0"/>
+              <a:t>cientific</a:t>
+            </a:r>
+            <a:r>
+              <a:rPr lang="es-ES" dirty="0" smtClean="0"/>
+              <a:t>, </a:t>
+            </a:r>
+          </a:p>
+          <a:p>
+            <a:r>
+              <a:rPr lang="ca-ES" smtClean="0"/>
+              <a:t>Problema:</a:t>
+            </a:r>
+            <a:endParaRPr lang="es-ES" dirty="0"/>
+          </a:p>
+          <a:p>
+            <a:r>
+              <a:rPr lang="ca-ES" dirty="0"/>
+              <a:t>Com se aixecant las globus de persones. </a:t>
+            </a:r>
+            <a:endParaRPr lang="es-ES" dirty="0"/>
+          </a:p>
+          <a:p>
+            <a:r>
+              <a:rPr lang="ca-ES" dirty="0"/>
+              <a:t>Hipòtesis per que escalfant al aire calen que hi a dintre.</a:t>
+            </a:r>
+            <a:endParaRPr lang="es-ES" dirty="0"/>
+          </a:p>
+          <a:p>
+            <a:r>
+              <a:rPr lang="ca-ES" dirty="0"/>
+              <a:t>Experiment. He comprovat que escalfant l’aire de una bossa aquesta se aixeca.</a:t>
+            </a:r>
+            <a:endParaRPr lang="es-ES" dirty="0"/>
+          </a:p>
+          <a:p>
+            <a:r>
+              <a:rPr lang="ca-ES" dirty="0"/>
+              <a:t>Conclusió: Es veritat l’ara calen es menis dens que l’aïra del seu voltant </a:t>
+            </a:r>
+            <a:endParaRPr lang="es-ES" dirty="0"/>
           </a:p>
         </p:txBody>
       </p:sp>

</xml_diff>